<commit_message>
Modify T3 with Hackers ad, Modify T4 with new qn
</commit_message>
<xml_diff>
--- a/CS2100/CS2100 Tutorial 2.pptx
+++ b/CS2100/CS2100 Tutorial 2.pptx
@@ -220,7 +220,7 @@
           <a:p>
             <a:fld id="{88602102-26BC-4ECA-9243-6BB9B8BC366F}" type="datetimeFigureOut">
               <a:rPr lang="en-US" smtClean="0"/>
-              <a:t>9/5/2024</a:t>
+              <a:t>9/6/2024</a:t>
             </a:fld>
             <a:endParaRPr lang="en-US"/>
           </a:p>
@@ -1478,7 +1478,7 @@
           <a:p>
             <a:fld id="{6CCF18BA-79E2-4428-BC0A-399EA0551CA6}" type="datetimeFigureOut">
               <a:rPr lang="en-US" smtClean="0"/>
-              <a:t>9/5/2024</a:t>
+              <a:t>9/6/2024</a:t>
             </a:fld>
             <a:endParaRPr lang="en-US"/>
           </a:p>
@@ -1708,7 +1708,7 @@
           <a:p>
             <a:fld id="{6CCF18BA-79E2-4428-BC0A-399EA0551CA6}" type="datetimeFigureOut">
               <a:rPr lang="en-US" smtClean="0"/>
-              <a:t>9/5/2024</a:t>
+              <a:t>9/6/2024</a:t>
             </a:fld>
             <a:endParaRPr lang="en-US"/>
           </a:p>
@@ -1948,7 +1948,7 @@
           <a:p>
             <a:fld id="{6CCF18BA-79E2-4428-BC0A-399EA0551CA6}" type="datetimeFigureOut">
               <a:rPr lang="en-US" smtClean="0"/>
-              <a:t>9/5/2024</a:t>
+              <a:t>9/6/2024</a:t>
             </a:fld>
             <a:endParaRPr lang="en-US"/>
           </a:p>
@@ -2178,7 +2178,7 @@
           <a:p>
             <a:fld id="{6CCF18BA-79E2-4428-BC0A-399EA0551CA6}" type="datetimeFigureOut">
               <a:rPr lang="en-US" smtClean="0"/>
-              <a:t>9/5/2024</a:t>
+              <a:t>9/6/2024</a:t>
             </a:fld>
             <a:endParaRPr lang="en-US"/>
           </a:p>
@@ -2456,7 +2456,7 @@
           <a:p>
             <a:fld id="{6CCF18BA-79E2-4428-BC0A-399EA0551CA6}" type="datetimeFigureOut">
               <a:rPr lang="en-US" smtClean="0"/>
-              <a:t>9/5/2024</a:t>
+              <a:t>9/6/2024</a:t>
             </a:fld>
             <a:endParaRPr lang="en-US"/>
           </a:p>
@@ -2779,7 +2779,7 @@
           <a:p>
             <a:fld id="{6CCF18BA-79E2-4428-BC0A-399EA0551CA6}" type="datetimeFigureOut">
               <a:rPr lang="en-US" smtClean="0"/>
-              <a:t>9/5/2024</a:t>
+              <a:t>9/6/2024</a:t>
             </a:fld>
             <a:endParaRPr lang="en-US"/>
           </a:p>
@@ -3253,7 +3253,7 @@
           <a:p>
             <a:fld id="{6CCF18BA-79E2-4428-BC0A-399EA0551CA6}" type="datetimeFigureOut">
               <a:rPr lang="en-US" smtClean="0"/>
-              <a:t>9/5/2024</a:t>
+              <a:t>9/6/2024</a:t>
             </a:fld>
             <a:endParaRPr lang="en-US"/>
           </a:p>
@@ -3400,7 +3400,7 @@
           <a:p>
             <a:fld id="{6CCF18BA-79E2-4428-BC0A-399EA0551CA6}" type="datetimeFigureOut">
               <a:rPr lang="en-US" smtClean="0"/>
-              <a:t>9/5/2024</a:t>
+              <a:t>9/6/2024</a:t>
             </a:fld>
             <a:endParaRPr lang="en-US"/>
           </a:p>
@@ -3513,7 +3513,7 @@
           <a:p>
             <a:fld id="{6CCF18BA-79E2-4428-BC0A-399EA0551CA6}" type="datetimeFigureOut">
               <a:rPr lang="en-US" smtClean="0"/>
-              <a:t>9/5/2024</a:t>
+              <a:t>9/6/2024</a:t>
             </a:fld>
             <a:endParaRPr lang="en-US"/>
           </a:p>
@@ -3838,7 +3838,7 @@
           <a:p>
             <a:fld id="{6CCF18BA-79E2-4428-BC0A-399EA0551CA6}" type="datetimeFigureOut">
               <a:rPr lang="en-US" smtClean="0"/>
-              <a:t>9/5/2024</a:t>
+              <a:t>9/6/2024</a:t>
             </a:fld>
             <a:endParaRPr lang="en-US"/>
           </a:p>
@@ -4130,7 +4130,7 @@
           <a:p>
             <a:fld id="{6CCF18BA-79E2-4428-BC0A-399EA0551CA6}" type="datetimeFigureOut">
               <a:rPr lang="en-US" smtClean="0"/>
-              <a:t>9/5/2024</a:t>
+              <a:t>9/6/2024</a:t>
             </a:fld>
             <a:endParaRPr lang="en-US"/>
           </a:p>
@@ -4371,7 +4371,7 @@
           <a:p>
             <a:fld id="{6CCF18BA-79E2-4428-BC0A-399EA0551CA6}" type="datetimeFigureOut">
               <a:rPr lang="en-US" smtClean="0"/>
-              <a:t>9/5/2024</a:t>
+              <a:t>9/6/2024</a:t>
             </a:fld>
             <a:endParaRPr lang="en-US"/>
           </a:p>
@@ -4846,7 +4846,12 @@
             <p:ph type="subTitle" idx="1"/>
           </p:nvPr>
         </p:nvSpPr>
-        <p:spPr/>
+        <p:spPr>
+          <a:xfrm>
+            <a:off x="1524000" y="3602037"/>
+            <a:ext cx="9144000" cy="2387599"/>
+          </a:xfrm>
+        </p:spPr>
         <p:txBody>
           <a:bodyPr>
             <a:normAutofit/>
@@ -4891,12 +4896,27 @@
               </a:rPr>
               <a:t>(Any question before class just come forward; class starts on :05)</a:t>
             </a:r>
+            <a:br>
+              <a:rPr lang="en-US">
+                <a:solidFill>
+                  <a:schemeClr val="tx1">
+                    <a:lumMod val="95000"/>
+                    <a:lumOff val="5000"/>
+                  </a:schemeClr>
+                </a:solidFill>
+              </a:rPr>
+            </a:br>
+            <a:r>
+              <a:rPr lang="en-US">
+                <a:solidFill>
+                  <a:srgbClr val="C00000"/>
+                </a:solidFill>
+              </a:rPr>
+              <a:t>Take the MIPS sheet in front</a:t>
+            </a:r>
             <a:endParaRPr lang="en-US" dirty="0">
               <a:solidFill>
-                <a:schemeClr val="tx1">
-                  <a:lumMod val="95000"/>
-                  <a:lumOff val="5000"/>
-                </a:schemeClr>
+                <a:srgbClr val="C00000"/>
               </a:solidFill>
               <a:latin typeface="AndesNeue Alt 2 Book" panose="00000500000000000000" pitchFamily="2" charset="0"/>
             </a:endParaRPr>
@@ -6540,7 +6560,7 @@
                 <a:ea typeface="Iosevka Extended" panose="02000509030000000004" pitchFamily="49" charset="0"/>
                 <a:cs typeface="Iosevka Extended" panose="02000509030000000004" pitchFamily="49" charset="0"/>
               </a:rPr>
-              <a:t>$s1 	= … 1 </a:t>
+              <a:t>$s0 	= … 1 </a:t>
             </a:r>
             <a:r>
               <a:rPr lang="en-SG" sz="2400" u="sng">
@@ -6623,7 +6643,7 @@
                 <a:ea typeface="Iosevka Extended" panose="02000509030000000004" pitchFamily="49" charset="0"/>
                 <a:cs typeface="Iosevka Extended" panose="02000509030000000004" pitchFamily="49" charset="0"/>
               </a:rPr>
-              <a:t>$t1 	= … 1 </a:t>
+              <a:t>$s0 	= … 1 </a:t>
             </a:r>
             <a:r>
               <a:rPr lang="en-SG" sz="2400">

</xml_diff>